<commit_message>
Modificación TG2 presentación final
</commit_message>
<xml_diff>
--- a/TG2_Final.pptx
+++ b/TG2_Final.pptx
@@ -134,7 +134,7 @@
   </p:defaultTextStyle>
   <p:extLst>
     <p:ext uri="{EFAFB233-063F-42B5-8137-9DF3F51BA10A}">
-      <p15:sldGuideLst xmlns:p15="http://schemas.microsoft.com/office/powerpoint/2012/main">
+      <p15:sldGuideLst xmlns:p15="http://schemas.microsoft.com/office/powerpoint/2012/main" xmlns="">
         <p15:guide id="1" orient="horz" pos="2160">
           <p15:clr>
             <a:srgbClr val="A4A3A4"/>
@@ -343,7 +343,7 @@
             <a:fld id="{B61BEF0D-F0BB-DE4B-95CE-6DB70DBA9567}" type="datetimeFigureOut">
               <a:rPr lang="en-US" dirty="0"/>
               <a:pPr/>
-              <a:t>4/3/2017</a:t>
+              <a:t>4/4/2017</a:t>
             </a:fld>
             <a:endParaRPr lang="en-US" dirty="0"/>
           </a:p>
@@ -776,7 +776,7 @@
             <a:fld id="{B61BEF0D-F0BB-DE4B-95CE-6DB70DBA9567}" type="datetimeFigureOut">
               <a:rPr lang="en-US" dirty="0"/>
               <a:pPr/>
-              <a:t>4/3/2017</a:t>
+              <a:t>4/4/2017</a:t>
             </a:fld>
             <a:endParaRPr lang="en-US" dirty="0"/>
           </a:p>
@@ -1023,7 +1023,7 @@
             <a:fld id="{B61BEF0D-F0BB-DE4B-95CE-6DB70DBA9567}" type="datetimeFigureOut">
               <a:rPr lang="en-US" dirty="0"/>
               <a:pPr/>
-              <a:t>4/3/2017</a:t>
+              <a:t>4/4/2017</a:t>
             </a:fld>
             <a:endParaRPr lang="en-US" dirty="0"/>
           </a:p>
@@ -1328,7 +1328,7 @@
             <a:fld id="{B61BEF0D-F0BB-DE4B-95CE-6DB70DBA9567}" type="datetimeFigureOut">
               <a:rPr lang="en-US" dirty="0"/>
               <a:pPr/>
-              <a:t>4/3/2017</a:t>
+              <a:t>4/4/2017</a:t>
             </a:fld>
             <a:endParaRPr lang="en-US" dirty="0"/>
           </a:p>
@@ -1643,7 +1643,7 @@
             <a:fld id="{B61BEF0D-F0BB-DE4B-95CE-6DB70DBA9567}" type="datetimeFigureOut">
               <a:rPr lang="en-US" dirty="0"/>
               <a:pPr/>
-              <a:t>4/3/2017</a:t>
+              <a:t>4/4/2017</a:t>
             </a:fld>
             <a:endParaRPr lang="en-US" dirty="0"/>
           </a:p>
@@ -1942,7 +1942,7 @@
             <a:fld id="{B61BEF0D-F0BB-DE4B-95CE-6DB70DBA9567}" type="datetimeFigureOut">
               <a:rPr lang="en-US" dirty="0"/>
               <a:pPr/>
-              <a:t>4/3/2017</a:t>
+              <a:t>4/4/2017</a:t>
             </a:fld>
             <a:endParaRPr lang="en-US" dirty="0"/>
           </a:p>
@@ -2306,7 +2306,7 @@
             <a:fld id="{B61BEF0D-F0BB-DE4B-95CE-6DB70DBA9567}" type="datetimeFigureOut">
               <a:rPr lang="en-US" dirty="0"/>
               <a:pPr/>
-              <a:t>4/3/2017</a:t>
+              <a:t>4/4/2017</a:t>
             </a:fld>
             <a:endParaRPr lang="en-US" dirty="0"/>
           </a:p>
@@ -2477,7 +2477,7 @@
             <a:fld id="{B61BEF0D-F0BB-DE4B-95CE-6DB70DBA9567}" type="datetimeFigureOut">
               <a:rPr lang="en-US" dirty="0"/>
               <a:pPr/>
-              <a:t>4/3/2017</a:t>
+              <a:t>4/4/2017</a:t>
             </a:fld>
             <a:endParaRPr lang="en-US" dirty="0"/>
           </a:p>
@@ -2654,7 +2654,7 @@
             <a:fld id="{B61BEF0D-F0BB-DE4B-95CE-6DB70DBA9567}" type="datetimeFigureOut">
               <a:rPr lang="en-US" dirty="0"/>
               <a:pPr/>
-              <a:t>4/3/2017</a:t>
+              <a:t>4/4/2017</a:t>
             </a:fld>
             <a:endParaRPr lang="en-US" dirty="0"/>
           </a:p>
@@ -2821,7 +2821,7 @@
             <a:fld id="{B61BEF0D-F0BB-DE4B-95CE-6DB70DBA9567}" type="datetimeFigureOut">
               <a:rPr lang="en-US" dirty="0"/>
               <a:pPr/>
-              <a:t>4/3/2017</a:t>
+              <a:t>4/4/2017</a:t>
             </a:fld>
             <a:endParaRPr lang="en-US" dirty="0"/>
           </a:p>
@@ -3068,7 +3068,7 @@
             <a:fld id="{B61BEF0D-F0BB-DE4B-95CE-6DB70DBA9567}" type="datetimeFigureOut">
               <a:rPr lang="en-US" dirty="0"/>
               <a:pPr/>
-              <a:t>4/3/2017</a:t>
+              <a:t>4/4/2017</a:t>
             </a:fld>
             <a:endParaRPr lang="en-US" dirty="0"/>
           </a:p>
@@ -3301,7 +3301,7 @@
             <a:fld id="{B61BEF0D-F0BB-DE4B-95CE-6DB70DBA9567}" type="datetimeFigureOut">
               <a:rPr lang="en-US" dirty="0"/>
               <a:pPr/>
-              <a:t>4/3/2017</a:t>
+              <a:t>4/4/2017</a:t>
             </a:fld>
             <a:endParaRPr lang="en-US" dirty="0"/>
           </a:p>
@@ -3680,7 +3680,7 @@
             <a:fld id="{B61BEF0D-F0BB-DE4B-95CE-6DB70DBA9567}" type="datetimeFigureOut">
               <a:rPr lang="en-US" dirty="0"/>
               <a:pPr/>
-              <a:t>4/3/2017</a:t>
+              <a:t>4/4/2017</a:t>
             </a:fld>
             <a:endParaRPr lang="en-US" dirty="0"/>
           </a:p>
@@ -3795,7 +3795,7 @@
             <a:fld id="{B61BEF0D-F0BB-DE4B-95CE-6DB70DBA9567}" type="datetimeFigureOut">
               <a:rPr lang="en-US" dirty="0"/>
               <a:pPr/>
-              <a:t>4/3/2017</a:t>
+              <a:t>4/4/2017</a:t>
             </a:fld>
             <a:endParaRPr lang="en-US" dirty="0"/>
           </a:p>
@@ -3887,7 +3887,7 @@
             <a:fld id="{B61BEF0D-F0BB-DE4B-95CE-6DB70DBA9567}" type="datetimeFigureOut">
               <a:rPr lang="en-US" dirty="0"/>
               <a:pPr/>
-              <a:t>4/3/2017</a:t>
+              <a:t>4/4/2017</a:t>
             </a:fld>
             <a:endParaRPr lang="en-US" dirty="0"/>
           </a:p>
@@ -4139,7 +4139,7 @@
             <a:fld id="{B61BEF0D-F0BB-DE4B-95CE-6DB70DBA9567}" type="datetimeFigureOut">
               <a:rPr lang="en-US" dirty="0"/>
               <a:pPr/>
-              <a:t>4/3/2017</a:t>
+              <a:t>4/4/2017</a:t>
             </a:fld>
             <a:endParaRPr lang="en-US" dirty="0"/>
           </a:p>
@@ -4419,7 +4419,7 @@
             <a:fld id="{B61BEF0D-F0BB-DE4B-95CE-6DB70DBA9567}" type="datetimeFigureOut">
               <a:rPr lang="en-US" dirty="0"/>
               <a:pPr/>
-              <a:t>4/3/2017</a:t>
+              <a:t>4/4/2017</a:t>
             </a:fld>
             <a:endParaRPr lang="en-US" dirty="0"/>
           </a:p>
@@ -4822,7 +4822,7 @@
             <a:fld id="{B61BEF0D-F0BB-DE4B-95CE-6DB70DBA9567}" type="datetimeFigureOut">
               <a:rPr lang="en-US" dirty="0"/>
               <a:pPr/>
-              <a:t>4/3/2017</a:t>
+              <a:t>4/4/2017</a:t>
             </a:fld>
             <a:endParaRPr lang="en-US" dirty="0"/>
           </a:p>
@@ -5835,17 +5835,7 @@
         </p:nvPicPr>
         <p:blipFill>
           <a:blip r:embed="rId2">
-            <a:extLst>
-              <a:ext uri="{BEBA8EAE-BF5A-486C-A8C5-ECC9F3942E4B}">
-                <a14:imgProps xmlns:a14="http://schemas.microsoft.com/office/drawing/2010/main">
-                  <a14:imgLayer>
-                    <a14:imgEffect>
-                      <a14:brightnessContrast bright="-40000" contrast="20000"/>
-                    </a14:imgEffect>
-                  </a14:imgLayer>
-                </a14:imgProps>
-              </a:ext>
-            </a:extLst>
+            <a:extLst/>
           </a:blip>
           <a:stretch>
             <a:fillRect/>
@@ -6031,17 +6021,7 @@
         </p:nvPicPr>
         <p:blipFill>
           <a:blip r:embed="rId2">
-            <a:extLst>
-              <a:ext uri="{BEBA8EAE-BF5A-486C-A8C5-ECC9F3942E4B}">
-                <a14:imgProps xmlns:a14="http://schemas.microsoft.com/office/drawing/2010/main">
-                  <a14:imgLayer>
-                    <a14:imgEffect>
-                      <a14:brightnessContrast bright="-40000" contrast="20000"/>
-                    </a14:imgEffect>
-                  </a14:imgLayer>
-                </a14:imgProps>
-              </a:ext>
-            </a:extLst>
+            <a:extLst/>
           </a:blip>
           <a:stretch>
             <a:fillRect/>
@@ -6143,17 +6123,7 @@
         </p:nvPicPr>
         <p:blipFill>
           <a:blip r:embed="rId2">
-            <a:extLst>
-              <a:ext uri="{BEBA8EAE-BF5A-486C-A8C5-ECC9F3942E4B}">
-                <a14:imgProps xmlns:a14="http://schemas.microsoft.com/office/drawing/2010/main">
-                  <a14:imgLayer>
-                    <a14:imgEffect>
-                      <a14:brightnessContrast bright="-40000" contrast="20000"/>
-                    </a14:imgEffect>
-                  </a14:imgLayer>
-                </a14:imgProps>
-              </a:ext>
-            </a:extLst>
+            <a:extLst/>
           </a:blip>
           <a:stretch>
             <a:fillRect/>
@@ -6260,17 +6230,7 @@
         </p:nvPicPr>
         <p:blipFill>
           <a:blip r:embed="rId2">
-            <a:extLst>
-              <a:ext uri="{BEBA8EAE-BF5A-486C-A8C5-ECC9F3942E4B}">
-                <a14:imgProps xmlns:a14="http://schemas.microsoft.com/office/drawing/2010/main">
-                  <a14:imgLayer>
-                    <a14:imgEffect>
-                      <a14:brightnessContrast bright="-40000" contrast="20000"/>
-                    </a14:imgEffect>
-                  </a14:imgLayer>
-                </a14:imgProps>
-              </a:ext>
-            </a:extLst>
+            <a:extLst/>
           </a:blip>
           <a:stretch>
             <a:fillRect/>
@@ -6372,17 +6332,7 @@
         </p:nvPicPr>
         <p:blipFill>
           <a:blip r:embed="rId2">
-            <a:extLst>
-              <a:ext uri="{BEBA8EAE-BF5A-486C-A8C5-ECC9F3942E4B}">
-                <a14:imgProps xmlns:a14="http://schemas.microsoft.com/office/drawing/2010/main">
-                  <a14:imgLayer>
-                    <a14:imgEffect>
-                      <a14:brightnessContrast bright="-40000" contrast="20000"/>
-                    </a14:imgEffect>
-                  </a14:imgLayer>
-                </a14:imgProps>
-              </a:ext>
-            </a:extLst>
+            <a:extLst/>
           </a:blip>
           <a:stretch>
             <a:fillRect/>
@@ -6484,17 +6434,7 @@
         </p:nvPicPr>
         <p:blipFill>
           <a:blip r:embed="rId2">
-            <a:extLst>
-              <a:ext uri="{BEBA8EAE-BF5A-486C-A8C5-ECC9F3942E4B}">
-                <a14:imgProps xmlns:a14="http://schemas.microsoft.com/office/drawing/2010/main">
-                  <a14:imgLayer>
-                    <a14:imgEffect>
-                      <a14:brightnessContrast bright="-40000" contrast="20000"/>
-                    </a14:imgEffect>
-                  </a14:imgLayer>
-                </a14:imgProps>
-              </a:ext>
-            </a:extLst>
+            <a:extLst/>
           </a:blip>
           <a:stretch>
             <a:fillRect/>
@@ -6596,17 +6536,7 @@
         </p:nvPicPr>
         <p:blipFill>
           <a:blip r:embed="rId2">
-            <a:extLst>
-              <a:ext uri="{BEBA8EAE-BF5A-486C-A8C5-ECC9F3942E4B}">
-                <a14:imgProps xmlns:a14="http://schemas.microsoft.com/office/drawing/2010/main">
-                  <a14:imgLayer>
-                    <a14:imgEffect>
-                      <a14:brightnessContrast bright="-40000" contrast="20000"/>
-                    </a14:imgEffect>
-                  </a14:imgLayer>
-                </a14:imgProps>
-              </a:ext>
-            </a:extLst>
+            <a:extLst/>
           </a:blip>
           <a:stretch>
             <a:fillRect/>
@@ -6708,17 +6638,7 @@
         </p:nvPicPr>
         <p:blipFill>
           <a:blip r:embed="rId2">
-            <a:extLst>
-              <a:ext uri="{BEBA8EAE-BF5A-486C-A8C5-ECC9F3942E4B}">
-                <a14:imgProps xmlns:a14="http://schemas.microsoft.com/office/drawing/2010/main">
-                  <a14:imgLayer>
-                    <a14:imgEffect>
-                      <a14:brightnessContrast bright="-40000" contrast="20000"/>
-                    </a14:imgEffect>
-                  </a14:imgLayer>
-                </a14:imgProps>
-              </a:ext>
-            </a:extLst>
+            <a:extLst/>
           </a:blip>
           <a:stretch>
             <a:fillRect/>
@@ -6820,17 +6740,7 @@
         </p:nvPicPr>
         <p:blipFill>
           <a:blip r:embed="rId2">
-            <a:extLst>
-              <a:ext uri="{BEBA8EAE-BF5A-486C-A8C5-ECC9F3942E4B}">
-                <a14:imgProps xmlns:a14="http://schemas.microsoft.com/office/drawing/2010/main">
-                  <a14:imgLayer>
-                    <a14:imgEffect>
-                      <a14:brightnessContrast bright="-40000" contrast="20000"/>
-                    </a14:imgEffect>
-                  </a14:imgLayer>
-                </a14:imgProps>
-              </a:ext>
-            </a:extLst>
+            <a:extLst/>
           </a:blip>
           <a:stretch>
             <a:fillRect/>
@@ -7192,17 +7102,7 @@
         </p:nvPicPr>
         <p:blipFill>
           <a:blip r:embed="rId2">
-            <a:extLst>
-              <a:ext uri="{BEBA8EAE-BF5A-486C-A8C5-ECC9F3942E4B}">
-                <a14:imgProps xmlns:a14="http://schemas.microsoft.com/office/drawing/2010/main">
-                  <a14:imgLayer>
-                    <a14:imgEffect>
-                      <a14:brightnessContrast bright="-40000" contrast="20000"/>
-                    </a14:imgEffect>
-                  </a14:imgLayer>
-                </a14:imgProps>
-              </a:ext>
-            </a:extLst>
+            <a:extLst/>
           </a:blip>
           <a:stretch>
             <a:fillRect/>
@@ -7304,17 +7204,7 @@
         </p:nvPicPr>
         <p:blipFill>
           <a:blip r:embed="rId2">
-            <a:extLst>
-              <a:ext uri="{BEBA8EAE-BF5A-486C-A8C5-ECC9F3942E4B}">
-                <a14:imgProps xmlns:a14="http://schemas.microsoft.com/office/drawing/2010/main">
-                  <a14:imgLayer>
-                    <a14:imgEffect>
-                      <a14:brightnessContrast bright="-40000" contrast="20000"/>
-                    </a14:imgEffect>
-                  </a14:imgLayer>
-                </a14:imgProps>
-              </a:ext>
-            </a:extLst>
+            <a:extLst/>
           </a:blip>
           <a:stretch>
             <a:fillRect/>
@@ -7416,17 +7306,7 @@
         </p:nvPicPr>
         <p:blipFill>
           <a:blip r:embed="rId2">
-            <a:extLst>
-              <a:ext uri="{BEBA8EAE-BF5A-486C-A8C5-ECC9F3942E4B}">
-                <a14:imgProps xmlns:a14="http://schemas.microsoft.com/office/drawing/2010/main">
-                  <a14:imgLayer>
-                    <a14:imgEffect>
-                      <a14:brightnessContrast bright="-40000" contrast="20000"/>
-                    </a14:imgEffect>
-                  </a14:imgLayer>
-                </a14:imgProps>
-              </a:ext>
-            </a:extLst>
+            <a:extLst/>
           </a:blip>
           <a:stretch>
             <a:fillRect/>
@@ -7528,17 +7408,7 @@
         </p:nvPicPr>
         <p:blipFill>
           <a:blip r:embed="rId2">
-            <a:extLst>
-              <a:ext uri="{BEBA8EAE-BF5A-486C-A8C5-ECC9F3942E4B}">
-                <a14:imgProps xmlns:a14="http://schemas.microsoft.com/office/drawing/2010/main">
-                  <a14:imgLayer>
-                    <a14:imgEffect>
-                      <a14:brightnessContrast bright="-40000" contrast="20000"/>
-                    </a14:imgEffect>
-                  </a14:imgLayer>
-                </a14:imgProps>
-              </a:ext>
-            </a:extLst>
+            <a:extLst/>
           </a:blip>
           <a:stretch>
             <a:fillRect/>
@@ -7640,17 +7510,7 @@
         </p:nvPicPr>
         <p:blipFill>
           <a:blip r:embed="rId2">
-            <a:extLst>
-              <a:ext uri="{BEBA8EAE-BF5A-486C-A8C5-ECC9F3942E4B}">
-                <a14:imgProps xmlns:a14="http://schemas.microsoft.com/office/drawing/2010/main">
-                  <a14:imgLayer>
-                    <a14:imgEffect>
-                      <a14:brightnessContrast bright="-40000" contrast="20000"/>
-                    </a14:imgEffect>
-                  </a14:imgLayer>
-                </a14:imgProps>
-              </a:ext>
-            </a:extLst>
+            <a:extLst/>
           </a:blip>
           <a:stretch>
             <a:fillRect/>
@@ -7752,17 +7612,7 @@
         </p:nvPicPr>
         <p:blipFill>
           <a:blip r:embed="rId2">
-            <a:extLst>
-              <a:ext uri="{BEBA8EAE-BF5A-486C-A8C5-ECC9F3942E4B}">
-                <a14:imgProps xmlns:a14="http://schemas.microsoft.com/office/drawing/2010/main">
-                  <a14:imgLayer>
-                    <a14:imgEffect>
-                      <a14:brightnessContrast bright="-40000" contrast="20000"/>
-                    </a14:imgEffect>
-                  </a14:imgLayer>
-                </a14:imgProps>
-              </a:ext>
-            </a:extLst>
+            <a:extLst/>
           </a:blip>
           <a:stretch>
             <a:fillRect/>
@@ -7980,7 +7830,7 @@
               </a:rPr>
               <a:t>”</a:t>
             </a:r>
-            <a:endParaRPr kumimoji="0" lang="es-ES" sz="3400" b="1" i="0" u="sng" strike="noStrike" kern="1200" cap="all" spc="0" normalizeH="0" baseline="0" noProof="0" dirty="0">
+            <a:endParaRPr kumimoji="0" lang="es-ES" sz="3400" i="0" u="sng" strike="noStrike" kern="1200" cap="all" spc="0" normalizeH="0" baseline="0" noProof="0" dirty="0">
               <a:ln w="3175" cmpd="sng">
                 <a:noFill/>
               </a:ln>
@@ -8364,25 +8214,14 @@
         </p:spPr>
         <p:txBody>
           <a:bodyPr vert="horz" lIns="91440" tIns="45720" rIns="91440" bIns="45720" rtlCol="0" anchor="b">
-            <a:normAutofit fontScale="92500" lnSpcReduction="10000"/>
+            <a:normAutofit fontScale="77500" lnSpcReduction="20000"/>
           </a:bodyPr>
           <a:lstStyle/>
           <a:p>
-            <a:pPr marL="0" marR="0" lvl="0" indent="0" algn="l" defTabSz="457200" rtl="0" eaLnBrk="1" fontAlgn="auto" latinLnBrk="0" hangingPunct="1">
-              <a:lnSpc>
-                <a:spcPct val="100000"/>
-              </a:lnSpc>
+            <a:pPr lvl="0">
               <a:spcBef>
                 <a:spcPct val="0"/>
               </a:spcBef>
-              <a:spcAft>
-                <a:spcPts val="0"/>
-              </a:spcAft>
-              <a:buClrTx/>
-              <a:buSzTx/>
-              <a:buFontTx/>
-              <a:buNone/>
-              <a:tabLst/>
               <a:defRPr/>
             </a:pPr>
             <a:r>
@@ -8397,7 +8236,77 @@
                 <a:ea typeface="+mj-ea"/>
                 <a:cs typeface="+mj-cs"/>
               </a:rPr>
-              <a:t>5.2. Recomendación de uso “red Social”</a:t>
+              <a:t>5.2. Recomendación de uso </a:t>
+            </a:r>
+            <a:r>
+              <a:rPr lang="es-ES" sz="3500" u="sng" cap="all" noProof="0" dirty="0" smtClean="0">
+                <a:ln w="3175" cmpd="sng">
+                  <a:noFill/>
+                </a:ln>
+                <a:solidFill>
+                  <a:schemeClr val="bg1"/>
+                </a:solidFill>
+                <a:latin typeface="Arial Rounded MT Bold" panose="020F0704030504030204" pitchFamily="34" charset="0"/>
+                <a:ea typeface="+mj-ea"/>
+                <a:cs typeface="+mj-cs"/>
+              </a:rPr>
+              <a:t>“</a:t>
+            </a:r>
+            <a:r>
+              <a:rPr lang="es-ES" sz="3500" u="sng" cap="all" dirty="0" err="1">
+                <a:ln w="3175" cmpd="sng">
+                  <a:noFill/>
+                </a:ln>
+                <a:solidFill>
+                  <a:schemeClr val="bg1"/>
+                </a:solidFill>
+                <a:latin typeface="Arial Rounded MT Bold" panose="020F0704030504030204" pitchFamily="34" charset="0"/>
+                <a:ea typeface="+mj-ea"/>
+                <a:cs typeface="+mj-cs"/>
+              </a:rPr>
+              <a:t>Technological</a:t>
+            </a:r>
+            <a:r>
+              <a:rPr lang="es-ES" sz="3500" u="sng" cap="all" dirty="0">
+                <a:ln w="3175" cmpd="sng">
+                  <a:noFill/>
+                </a:ln>
+                <a:solidFill>
+                  <a:schemeClr val="bg1"/>
+                </a:solidFill>
+                <a:latin typeface="Arial Rounded MT Bold" panose="020F0704030504030204" pitchFamily="34" charset="0"/>
+                <a:ea typeface="+mj-ea"/>
+                <a:cs typeface="+mj-cs"/>
+              </a:rPr>
+              <a:t> </a:t>
+            </a:r>
+            <a:r>
+              <a:rPr lang="es-ES" sz="3500" u="sng" cap="all" dirty="0" err="1">
+                <a:ln w="3175" cmpd="sng">
+                  <a:noFill/>
+                </a:ln>
+                <a:solidFill>
+                  <a:schemeClr val="bg1"/>
+                </a:solidFill>
+                <a:latin typeface="Arial Rounded MT Bold" panose="020F0704030504030204" pitchFamily="34" charset="0"/>
+                <a:ea typeface="+mj-ea"/>
+                <a:cs typeface="+mj-cs"/>
+              </a:rPr>
+              <a:t>market</a:t>
+            </a:r>
+            <a:r>
+              <a:rPr lang="es-ES" sz="3500" u="sng" cap="all" noProof="0" dirty="0" smtClean="0">
+                <a:ln w="3175" cmpd="sng">
+                  <a:noFill/>
+                </a:ln>
+                <a:solidFill>
+                  <a:schemeClr val="bg1"/>
+                </a:solidFill>
+                <a:latin typeface="Arial Rounded MT Bold" panose="020F0704030504030204" pitchFamily="34" charset="0"/>
+                <a:ea typeface="+mj-ea"/>
+                <a:cs typeface="+mj-cs"/>
+              </a:rPr>
+              <a:t>”</a:t>
             </a:r>
             <a:endParaRPr kumimoji="0" lang="es-ES" sz="3500" b="0" i="0" u="sng" strike="noStrike" kern="1200" cap="all" spc="0" normalizeH="0" baseline="0" noProof="0" dirty="0">
               <a:ln w="3175" cmpd="sng">
@@ -8425,14 +8334,14 @@
           <p:nvPr>
             <p:extLst>
               <p:ext uri="{D42A27DB-BD31-4B8C-83A1-F6EECF244321}">
-                <p14:modId xmlns:p14="http://schemas.microsoft.com/office/powerpoint/2010/main" val="1035239467"/>
+                <p14:modId xmlns:p14="http://schemas.microsoft.com/office/powerpoint/2010/main" val="3215538406"/>
               </p:ext>
             </p:extLst>
           </p:nvPr>
         </p:nvGraphicFramePr>
         <p:xfrm>
           <a:off x="384312" y="1286413"/>
-          <a:ext cx="10508973" cy="5308414"/>
+          <a:ext cx="10508973" cy="5360610"/>
         </p:xfrm>
         <a:graphic>
           <a:graphicData uri="http://schemas.openxmlformats.org/drawingml/2006/table">
@@ -8442,21 +8351,21 @@
                 <a:gridCol w="5539409">
                   <a:extLst>
                     <a:ext uri="{9D8B030D-6E8A-4147-A177-3AD203B41FA5}">
-                      <a16:colId xmlns:a16="http://schemas.microsoft.com/office/drawing/2014/main" val="20000"/>
+                      <a16:colId xmlns:a16="http://schemas.microsoft.com/office/drawing/2014/main" xmlns="" val="20000"/>
                     </a:ext>
                   </a:extLst>
                 </a:gridCol>
                 <a:gridCol w="2319130">
                   <a:extLst>
                     <a:ext uri="{9D8B030D-6E8A-4147-A177-3AD203B41FA5}">
-                      <a16:colId xmlns:a16="http://schemas.microsoft.com/office/drawing/2014/main" val="20001"/>
+                      <a16:colId xmlns:a16="http://schemas.microsoft.com/office/drawing/2014/main" xmlns="" val="20001"/>
                     </a:ext>
                   </a:extLst>
                 </a:gridCol>
                 <a:gridCol w="2650434">
                   <a:extLst>
                     <a:ext uri="{9D8B030D-6E8A-4147-A177-3AD203B41FA5}">
-                      <a16:colId xmlns:a16="http://schemas.microsoft.com/office/drawing/2014/main" val="20002"/>
+                      <a16:colId xmlns:a16="http://schemas.microsoft.com/office/drawing/2014/main" xmlns="" val="20002"/>
                     </a:ext>
                   </a:extLst>
                 </a:gridCol>
@@ -8746,7 +8655,7 @@
                 </a:tc>
                 <a:extLst>
                   <a:ext uri="{0D108BD9-81ED-4DB2-BD59-A6C34878D82A}">
-                    <a16:rowId xmlns:a16="http://schemas.microsoft.com/office/drawing/2014/main" val="10000"/>
+                    <a16:rowId xmlns:a16="http://schemas.microsoft.com/office/drawing/2014/main" xmlns="" val="10000"/>
                   </a:ext>
                 </a:extLst>
               </a:tr>
@@ -8756,7 +8665,7 @@
                     <a:bodyPr/>
                     <a:lstStyle/>
                     <a:p>
-                      <a:pPr marL="0" algn="r" defTabSz="457200" rtl="0" eaLnBrk="1" latinLnBrk="0" hangingPunct="1">
+                      <a:pPr marL="0" algn="l" defTabSz="457200" rtl="0" eaLnBrk="1" latinLnBrk="0" hangingPunct="1">
                         <a:lnSpc>
                           <a:spcPct val="107000"/>
                         </a:lnSpc>
@@ -8788,7 +8697,7 @@
                       </a:endParaRPr>
                     </a:p>
                     <a:p>
-                      <a:pPr marL="0" lvl="0" indent="-342900" algn="r" defTabSz="457200" rtl="0" eaLnBrk="1" latinLnBrk="0" hangingPunct="1">
+                      <a:pPr marL="0" lvl="0" indent="-342900" algn="l" defTabSz="457200" rtl="0" eaLnBrk="1" latinLnBrk="0" hangingPunct="1">
                         <a:lnSpc>
                           <a:spcPct val="107000"/>
                         </a:lnSpc>
@@ -8822,7 +8731,7 @@
                       </a:endParaRPr>
                     </a:p>
                     <a:p>
-                      <a:pPr marL="0" lvl="0" indent="-342900" algn="r" defTabSz="457200" rtl="0" eaLnBrk="1" latinLnBrk="0" hangingPunct="1">
+                      <a:pPr marL="0" lvl="0" indent="-342900" algn="l" defTabSz="457200" rtl="0" eaLnBrk="1" latinLnBrk="0" hangingPunct="1">
                         <a:lnSpc>
                           <a:spcPct val="107000"/>
                         </a:lnSpc>
@@ -9116,7 +9025,7 @@
                 </a:tc>
                 <a:extLst>
                   <a:ext uri="{0D108BD9-81ED-4DB2-BD59-A6C34878D82A}">
-                    <a16:rowId xmlns:a16="http://schemas.microsoft.com/office/drawing/2014/main" val="10001"/>
+                    <a16:rowId xmlns:a16="http://schemas.microsoft.com/office/drawing/2014/main" xmlns="" val="10001"/>
                   </a:ext>
                 </a:extLst>
               </a:tr>
@@ -9126,7 +9035,7 @@
                     <a:bodyPr/>
                     <a:lstStyle/>
                     <a:p>
-                      <a:pPr marL="0" algn="r" defTabSz="457200" rtl="0" eaLnBrk="1" latinLnBrk="0" hangingPunct="1">
+                      <a:pPr marL="0" algn="l" defTabSz="457200" rtl="0" eaLnBrk="1" latinLnBrk="0" hangingPunct="1">
                         <a:lnSpc>
                           <a:spcPct val="107000"/>
                         </a:lnSpc>
@@ -9194,7 +9103,7 @@
                       </a:r>
                     </a:p>
                     <a:p>
-                      <a:pPr marL="0" lvl="0" indent="-342900" algn="r" defTabSz="457200" rtl="0" eaLnBrk="1" latinLnBrk="0" hangingPunct="1">
+                      <a:pPr marL="0" lvl="0" indent="-342900" algn="l" defTabSz="457200" rtl="0" eaLnBrk="1" latinLnBrk="0" hangingPunct="1">
                         <a:lnSpc>
                           <a:spcPct val="107000"/>
                         </a:lnSpc>
@@ -9220,7 +9129,7 @@
                       </a:r>
                     </a:p>
                     <a:p>
-                      <a:pPr marL="0" lvl="0" indent="-342900" algn="r" defTabSz="457200" rtl="0" eaLnBrk="1" latinLnBrk="0" hangingPunct="1">
+                      <a:pPr marL="0" lvl="0" indent="-342900" algn="l" defTabSz="457200" rtl="0" eaLnBrk="1" latinLnBrk="0" hangingPunct="1">
                         <a:lnSpc>
                           <a:spcPct val="107000"/>
                         </a:lnSpc>
@@ -9524,7 +9433,7 @@
                 </a:tc>
                 <a:extLst>
                   <a:ext uri="{0D108BD9-81ED-4DB2-BD59-A6C34878D82A}">
-                    <a16:rowId xmlns:a16="http://schemas.microsoft.com/office/drawing/2014/main" val="10002"/>
+                    <a16:rowId xmlns:a16="http://schemas.microsoft.com/office/drawing/2014/main" xmlns="" val="10002"/>
                   </a:ext>
                 </a:extLst>
               </a:tr>
@@ -9534,7 +9443,7 @@
                     <a:bodyPr/>
                     <a:lstStyle/>
                     <a:p>
-                      <a:pPr marL="0" algn="r" defTabSz="457200" rtl="0" eaLnBrk="1" latinLnBrk="0" hangingPunct="1">
+                      <a:pPr marL="0" algn="l" defTabSz="457200" rtl="0" eaLnBrk="1" latinLnBrk="0" hangingPunct="1">
                         <a:lnSpc>
                           <a:spcPct val="107000"/>
                         </a:lnSpc>
@@ -9588,7 +9497,7 @@
                       </a:endParaRPr>
                     </a:p>
                     <a:p>
-                      <a:pPr marL="0" lvl="0" indent="-342900" algn="r" defTabSz="457200" rtl="0" eaLnBrk="1" latinLnBrk="0" hangingPunct="1">
+                      <a:pPr marL="0" lvl="0" indent="-342900" algn="l" defTabSz="457200" rtl="0" eaLnBrk="1" latinLnBrk="0" hangingPunct="1">
                         <a:lnSpc>
                           <a:spcPct val="107000"/>
                         </a:lnSpc>
@@ -9829,7 +9738,7 @@
                 </a:tc>
                 <a:extLst>
                   <a:ext uri="{0D108BD9-81ED-4DB2-BD59-A6C34878D82A}">
-                    <a16:rowId xmlns:a16="http://schemas.microsoft.com/office/drawing/2014/main" val="10003"/>
+                    <a16:rowId xmlns:a16="http://schemas.microsoft.com/office/drawing/2014/main" xmlns="" val="10003"/>
                   </a:ext>
                 </a:extLst>
               </a:tr>
@@ -9839,7 +9748,7 @@
                     <a:bodyPr/>
                     <a:lstStyle/>
                     <a:p>
-                      <a:pPr marL="0" algn="r" defTabSz="457200" rtl="0" eaLnBrk="1" latinLnBrk="0" hangingPunct="1">
+                      <a:pPr marL="0" algn="l" defTabSz="457200" rtl="0" eaLnBrk="1" latinLnBrk="0" hangingPunct="1">
                         <a:lnSpc>
                           <a:spcPct val="107000"/>
                         </a:lnSpc>
@@ -9863,7 +9772,7 @@
                       </a:r>
                     </a:p>
                     <a:p>
-                      <a:pPr marL="0" lvl="0" indent="-342900" algn="r" defTabSz="457200" rtl="0" eaLnBrk="1" latinLnBrk="0" hangingPunct="1">
+                      <a:pPr marL="0" lvl="0" indent="-342900" algn="l" defTabSz="457200" rtl="0" eaLnBrk="1" latinLnBrk="0" hangingPunct="1">
                         <a:lnSpc>
                           <a:spcPct val="107000"/>
                         </a:lnSpc>
@@ -9889,7 +9798,7 @@
                       </a:r>
                     </a:p>
                     <a:p>
-                      <a:pPr marL="0" lvl="0" indent="-342900" algn="r" defTabSz="457200" rtl="0" eaLnBrk="1" latinLnBrk="0" hangingPunct="1">
+                      <a:pPr marL="0" lvl="0" indent="-342900" algn="l" defTabSz="457200" rtl="0" eaLnBrk="1" latinLnBrk="0" hangingPunct="1">
                         <a:lnSpc>
                           <a:spcPct val="107000"/>
                         </a:lnSpc>
@@ -10266,7 +10175,7 @@
                 </a:tc>
                 <a:extLst>
                   <a:ext uri="{0D108BD9-81ED-4DB2-BD59-A6C34878D82A}">
-                    <a16:rowId xmlns:a16="http://schemas.microsoft.com/office/drawing/2014/main" val="10004"/>
+                    <a16:rowId xmlns:a16="http://schemas.microsoft.com/office/drawing/2014/main" xmlns="" val="10004"/>
                   </a:ext>
                 </a:extLst>
               </a:tr>
@@ -10276,7 +10185,7 @@
                     <a:bodyPr/>
                     <a:lstStyle/>
                     <a:p>
-                      <a:pPr marL="0" algn="r" defTabSz="457200" rtl="0" eaLnBrk="1" latinLnBrk="0" hangingPunct="1">
+                      <a:pPr marL="0" algn="l" defTabSz="457200" rtl="0" eaLnBrk="1" latinLnBrk="0" hangingPunct="1">
                         <a:lnSpc>
                           <a:spcPct val="107000"/>
                         </a:lnSpc>
@@ -10308,7 +10217,7 @@
                       </a:endParaRPr>
                     </a:p>
                     <a:p>
-                      <a:pPr marL="0" lvl="0" indent="-342900" algn="r" defTabSz="457200" rtl="0" eaLnBrk="1" latinLnBrk="0" hangingPunct="1">
+                      <a:pPr marL="0" lvl="0" indent="-342900" algn="l" defTabSz="457200" rtl="0" eaLnBrk="1" latinLnBrk="0" hangingPunct="1">
                         <a:lnSpc>
                           <a:spcPct val="107000"/>
                         </a:lnSpc>
@@ -10607,7 +10516,7 @@
                 </a:tc>
                 <a:extLst>
                   <a:ext uri="{0D108BD9-81ED-4DB2-BD59-A6C34878D82A}">
-                    <a16:rowId xmlns:a16="http://schemas.microsoft.com/office/drawing/2014/main" val="10005"/>
+                    <a16:rowId xmlns:a16="http://schemas.microsoft.com/office/drawing/2014/main" xmlns="" val="10005"/>
                   </a:ext>
                 </a:extLst>
               </a:tr>
@@ -10617,7 +10526,7 @@
                     <a:bodyPr/>
                     <a:lstStyle/>
                     <a:p>
-                      <a:pPr marL="0" algn="r" defTabSz="457200" rtl="0" eaLnBrk="1" latinLnBrk="0" hangingPunct="1">
+                      <a:pPr marL="0" algn="l" defTabSz="457200" rtl="0" eaLnBrk="1" latinLnBrk="0" hangingPunct="1">
                         <a:lnSpc>
                           <a:spcPct val="107000"/>
                         </a:lnSpc>
@@ -10671,7 +10580,7 @@
                       </a:endParaRPr>
                     </a:p>
                     <a:p>
-                      <a:pPr marL="0" lvl="0" indent="-342900" algn="r" defTabSz="457200" rtl="0" eaLnBrk="1" latinLnBrk="0" hangingPunct="1">
+                      <a:pPr marL="0" lvl="0" indent="-342900" algn="l" defTabSz="457200" rtl="0" eaLnBrk="1" latinLnBrk="0" hangingPunct="1">
                         <a:lnSpc>
                           <a:spcPct val="107000"/>
                         </a:lnSpc>
@@ -10705,7 +10614,7 @@
                       </a:endParaRPr>
                     </a:p>
                     <a:p>
-                      <a:pPr marL="0" lvl="0" indent="-342900" algn="r" defTabSz="457200" rtl="0" eaLnBrk="1" latinLnBrk="0" hangingPunct="1">
+                      <a:pPr marL="0" lvl="0" indent="-342900" algn="l" defTabSz="457200" rtl="0" eaLnBrk="1" latinLnBrk="0" hangingPunct="1">
                         <a:lnSpc>
                           <a:spcPct val="107000"/>
                         </a:lnSpc>
@@ -10731,7 +10640,7 @@
                       </a:r>
                     </a:p>
                     <a:p>
-                      <a:pPr marL="0" lvl="0" indent="-342900" algn="r" defTabSz="457200" rtl="0" eaLnBrk="1" latinLnBrk="0" hangingPunct="1">
+                      <a:pPr marL="0" lvl="0" indent="-342900" algn="l" defTabSz="457200" rtl="0" eaLnBrk="1" latinLnBrk="0" hangingPunct="1">
                         <a:lnSpc>
                           <a:spcPct val="107000"/>
                         </a:lnSpc>
@@ -11132,7 +11041,7 @@
                 </a:tc>
                 <a:extLst>
                   <a:ext uri="{0D108BD9-81ED-4DB2-BD59-A6C34878D82A}">
-                    <a16:rowId xmlns:a16="http://schemas.microsoft.com/office/drawing/2014/main" val="10006"/>
+                    <a16:rowId xmlns:a16="http://schemas.microsoft.com/office/drawing/2014/main" xmlns="" val="10006"/>
                   </a:ext>
                 </a:extLst>
               </a:tr>
@@ -11142,7 +11051,7 @@
                     <a:bodyPr/>
                     <a:lstStyle/>
                     <a:p>
-                      <a:pPr marL="0" algn="r" defTabSz="457200" rtl="0" eaLnBrk="1" latinLnBrk="0" hangingPunct="1">
+                      <a:pPr marL="0" algn="l" defTabSz="457200" rtl="0" eaLnBrk="1" latinLnBrk="0" hangingPunct="1">
                         <a:lnSpc>
                           <a:spcPct val="107000"/>
                         </a:lnSpc>
@@ -11174,7 +11083,7 @@
                       </a:endParaRPr>
                     </a:p>
                     <a:p>
-                      <a:pPr marL="0" lvl="0" indent="-342900" algn="r" defTabSz="457200" rtl="0" eaLnBrk="1" latinLnBrk="0" hangingPunct="1">
+                      <a:pPr marL="0" lvl="0" indent="-342900" algn="l" defTabSz="457200" rtl="0" eaLnBrk="1" latinLnBrk="0" hangingPunct="1">
                         <a:lnSpc>
                           <a:spcPct val="107000"/>
                         </a:lnSpc>
@@ -11208,7 +11117,7 @@
                       </a:endParaRPr>
                     </a:p>
                     <a:p>
-                      <a:pPr marL="0" lvl="0" indent="-342900" algn="r" defTabSz="457200" rtl="0" eaLnBrk="1" latinLnBrk="0" hangingPunct="1">
+                      <a:pPr marL="0" lvl="0" indent="-342900" algn="l" defTabSz="457200" rtl="0" eaLnBrk="1" latinLnBrk="0" hangingPunct="1">
                         <a:lnSpc>
                           <a:spcPct val="107000"/>
                         </a:lnSpc>
@@ -11548,7 +11457,7 @@
                 </a:tc>
                 <a:extLst>
                   <a:ext uri="{0D108BD9-81ED-4DB2-BD59-A6C34878D82A}">
-                    <a16:rowId xmlns:a16="http://schemas.microsoft.com/office/drawing/2014/main" val="10007"/>
+                    <a16:rowId xmlns:a16="http://schemas.microsoft.com/office/drawing/2014/main" xmlns="" val="10007"/>
                   </a:ext>
                 </a:extLst>
               </a:tr>
@@ -11558,7 +11467,7 @@
                     <a:bodyPr/>
                     <a:lstStyle/>
                     <a:p>
-                      <a:pPr marL="0" algn="r" defTabSz="457200" rtl="0" eaLnBrk="1" latinLnBrk="0" hangingPunct="1">
+                      <a:pPr marL="0" algn="l" defTabSz="457200" rtl="0" eaLnBrk="1" latinLnBrk="0" hangingPunct="1">
                         <a:lnSpc>
                           <a:spcPct val="107000"/>
                         </a:lnSpc>
@@ -11590,7 +11499,7 @@
                       </a:endParaRPr>
                     </a:p>
                     <a:p>
-                      <a:pPr marL="0" algn="r" defTabSz="457200" rtl="0" eaLnBrk="1" latinLnBrk="0" hangingPunct="1">
+                      <a:pPr marL="0" algn="l" defTabSz="457200" rtl="0" eaLnBrk="1" latinLnBrk="0" hangingPunct="1">
                         <a:lnSpc>
                           <a:spcPct val="107000"/>
                         </a:lnSpc>
@@ -11622,7 +11531,7 @@
                       </a:endParaRPr>
                     </a:p>
                     <a:p>
-                      <a:pPr marL="0" algn="r" defTabSz="457200" rtl="0" eaLnBrk="1" latinLnBrk="0" hangingPunct="1">
+                      <a:pPr marL="0" algn="l" defTabSz="457200" rtl="0" eaLnBrk="1" latinLnBrk="0" hangingPunct="1">
                         <a:lnSpc>
                           <a:spcPct val="107000"/>
                         </a:lnSpc>
@@ -12041,7 +11950,7 @@
                 </a:tc>
                 <a:extLst>
                   <a:ext uri="{0D108BD9-81ED-4DB2-BD59-A6C34878D82A}">
-                    <a16:rowId xmlns:a16="http://schemas.microsoft.com/office/drawing/2014/main" val="10008"/>
+                    <a16:rowId xmlns:a16="http://schemas.microsoft.com/office/drawing/2014/main" xmlns="" val="10008"/>
                   </a:ext>
                 </a:extLst>
               </a:tr>
@@ -12089,17 +11998,7 @@
         </p:nvPicPr>
         <p:blipFill>
           <a:blip r:embed="rId2">
-            <a:extLst>
-              <a:ext uri="{BEBA8EAE-BF5A-486C-A8C5-ECC9F3942E4B}">
-                <a14:imgProps xmlns:a14="http://schemas.microsoft.com/office/drawing/2010/main">
-                  <a14:imgLayer>
-                    <a14:imgEffect>
-                      <a14:brightnessContrast bright="-40000" contrast="20000"/>
-                    </a14:imgEffect>
-                  </a14:imgLayer>
-                </a14:imgProps>
-              </a:ext>
-            </a:extLst>
+            <a:extLst/>
           </a:blip>
           <a:stretch>
             <a:fillRect/>
@@ -12416,17 +12315,7 @@
         </p:nvPicPr>
         <p:blipFill>
           <a:blip r:embed="rId2">
-            <a:extLst>
-              <a:ext uri="{BEBA8EAE-BF5A-486C-A8C5-ECC9F3942E4B}">
-                <a14:imgProps xmlns:a14="http://schemas.microsoft.com/office/drawing/2010/main">
-                  <a14:imgLayer>
-                    <a14:imgEffect>
-                      <a14:brightnessContrast bright="-40000" contrast="20000"/>
-                    </a14:imgEffect>
-                  </a14:imgLayer>
-                </a14:imgProps>
-              </a:ext>
-            </a:extLst>
+            <a:extLst/>
           </a:blip>
           <a:stretch>
             <a:fillRect/>
@@ -12484,6 +12373,20 @@
               <a:defRPr/>
             </a:pPr>
             <a:r>
+              <a:rPr lang="es-ES" sz="3400" b="1" u="sng" cap="all" noProof="0" dirty="0" smtClean="0">
+                <a:ln w="3175" cmpd="sng">
+                  <a:noFill/>
+                </a:ln>
+                <a:solidFill>
+                  <a:schemeClr val="bg1"/>
+                </a:solidFill>
+                <a:latin typeface="Arial Rounded MT Bold" panose="020F0704030504030204" pitchFamily="34" charset="0"/>
+                <a:ea typeface="+mj-ea"/>
+                <a:cs typeface="+mj-cs"/>
+              </a:rPr>
+              <a:t>5.1 </a:t>
+            </a:r>
+            <a:r>
               <a:rPr lang="es-ES" sz="3400" b="1" u="sng" cap="all" noProof="0" dirty="0">
                 <a:ln w="3175" cmpd="sng">
                   <a:noFill/>
@@ -12495,7 +12398,7 @@
                 <a:ea typeface="+mj-ea"/>
                 <a:cs typeface="+mj-cs"/>
               </a:rPr>
-              <a:t>5.2. Recomendación de uso “red Social”</a:t>
+              <a:t>Recomendación de uso “red Social”</a:t>
             </a:r>
             <a:endParaRPr kumimoji="0" lang="es-ES" sz="3400" b="1" i="0" u="sng" strike="noStrike" kern="1200" cap="all" spc="0" normalizeH="0" baseline="0" noProof="0" dirty="0">
               <a:ln w="3175" cmpd="sng">
@@ -12523,14 +12426,14 @@
           <p:nvPr>
             <p:extLst>
               <p:ext uri="{D42A27DB-BD31-4B8C-83A1-F6EECF244321}">
-                <p14:modId xmlns:p14="http://schemas.microsoft.com/office/powerpoint/2010/main" val="2852735009"/>
+                <p14:modId xmlns:p14="http://schemas.microsoft.com/office/powerpoint/2010/main" val="2347833117"/>
               </p:ext>
             </p:extLst>
           </p:nvPr>
         </p:nvGraphicFramePr>
         <p:xfrm>
           <a:off x="1257826" y="1457863"/>
-          <a:ext cx="9659155" cy="5329991"/>
+          <a:ext cx="9659155" cy="5407523"/>
         </p:xfrm>
         <a:graphic>
           <a:graphicData uri="http://schemas.openxmlformats.org/drawingml/2006/table">
@@ -12540,21 +12443,21 @@
                 <a:gridCol w="5279992">
                   <a:extLst>
                     <a:ext uri="{9D8B030D-6E8A-4147-A177-3AD203B41FA5}">
-                      <a16:colId xmlns:a16="http://schemas.microsoft.com/office/drawing/2014/main" val="20000"/>
+                      <a16:colId xmlns:a16="http://schemas.microsoft.com/office/drawing/2014/main" xmlns="" val="20000"/>
                     </a:ext>
                   </a:extLst>
                 </a:gridCol>
                 <a:gridCol w="1970814">
                   <a:extLst>
                     <a:ext uri="{9D8B030D-6E8A-4147-A177-3AD203B41FA5}">
-                      <a16:colId xmlns:a16="http://schemas.microsoft.com/office/drawing/2014/main" val="20001"/>
+                      <a16:colId xmlns:a16="http://schemas.microsoft.com/office/drawing/2014/main" xmlns="" val="20001"/>
                     </a:ext>
                   </a:extLst>
                 </a:gridCol>
                 <a:gridCol w="2408349">
                   <a:extLst>
                     <a:ext uri="{9D8B030D-6E8A-4147-A177-3AD203B41FA5}">
-                      <a16:colId xmlns:a16="http://schemas.microsoft.com/office/drawing/2014/main" val="20002"/>
+                      <a16:colId xmlns:a16="http://schemas.microsoft.com/office/drawing/2014/main" xmlns="" val="20002"/>
                     </a:ext>
                   </a:extLst>
                 </a:gridCol>
@@ -12861,7 +12764,7 @@
                 </a:tc>
                 <a:extLst>
                   <a:ext uri="{0D108BD9-81ED-4DB2-BD59-A6C34878D82A}">
-                    <a16:rowId xmlns:a16="http://schemas.microsoft.com/office/drawing/2014/main" val="10000"/>
+                    <a16:rowId xmlns:a16="http://schemas.microsoft.com/office/drawing/2014/main" xmlns="" val="10000"/>
                   </a:ext>
                 </a:extLst>
               </a:tr>
@@ -12871,7 +12774,7 @@
                     <a:bodyPr/>
                     <a:lstStyle/>
                     <a:p>
-                      <a:pPr algn="r">
+                      <a:pPr algn="l">
                         <a:lnSpc>
                           <a:spcPct val="107000"/>
                         </a:lnSpc>
@@ -12901,7 +12804,7 @@
                       </a:endParaRPr>
                     </a:p>
                     <a:p>
-                      <a:pPr marL="342900" lvl="0" indent="-342900" algn="r">
+                      <a:pPr marL="342900" lvl="0" indent="-342900" algn="l">
                         <a:lnSpc>
                           <a:spcPct val="107000"/>
                         </a:lnSpc>
@@ -13168,7 +13071,7 @@
                 </a:tc>
                 <a:extLst>
                   <a:ext uri="{0D108BD9-81ED-4DB2-BD59-A6C34878D82A}">
-                    <a16:rowId xmlns:a16="http://schemas.microsoft.com/office/drawing/2014/main" val="10001"/>
+                    <a16:rowId xmlns:a16="http://schemas.microsoft.com/office/drawing/2014/main" xmlns="" val="10001"/>
                   </a:ext>
                 </a:extLst>
               </a:tr>
@@ -13178,7 +13081,7 @@
                     <a:bodyPr/>
                     <a:lstStyle/>
                     <a:p>
-                      <a:pPr algn="r">
+                      <a:pPr algn="l">
                         <a:lnSpc>
                           <a:spcPct val="107000"/>
                         </a:lnSpc>
@@ -13205,7 +13108,7 @@
                       </a:endParaRPr>
                     </a:p>
                     <a:p>
-                      <a:pPr marL="342900" lvl="0" indent="-342900" algn="r">
+                      <a:pPr marL="342900" lvl="0" indent="-342900" algn="l">
                         <a:lnSpc>
                           <a:spcPct val="107000"/>
                         </a:lnSpc>
@@ -13708,7 +13611,7 @@
                 </a:tc>
                 <a:extLst>
                   <a:ext uri="{0D108BD9-81ED-4DB2-BD59-A6C34878D82A}">
-                    <a16:rowId xmlns:a16="http://schemas.microsoft.com/office/drawing/2014/main" val="10002"/>
+                    <a16:rowId xmlns:a16="http://schemas.microsoft.com/office/drawing/2014/main" xmlns="" val="10002"/>
                   </a:ext>
                 </a:extLst>
               </a:tr>
@@ -13718,7 +13621,7 @@
                     <a:bodyPr/>
                     <a:lstStyle/>
                     <a:p>
-                      <a:pPr algn="r">
+                      <a:pPr algn="l">
                         <a:lnSpc>
                           <a:spcPct val="107000"/>
                         </a:lnSpc>
@@ -13738,7 +13641,7 @@
                       </a:r>
                     </a:p>
                     <a:p>
-                      <a:pPr marL="342900" lvl="0" indent="-342900" algn="r">
+                      <a:pPr marL="342900" lvl="0" indent="-342900" algn="l">
                         <a:lnSpc>
                           <a:spcPct val="107000"/>
                         </a:lnSpc>
@@ -13760,7 +13663,7 @@
                       </a:r>
                     </a:p>
                     <a:p>
-                      <a:pPr marL="342900" lvl="0" indent="-342900" algn="r">
+                      <a:pPr marL="342900" lvl="0" indent="-342900" algn="l">
                         <a:lnSpc>
                           <a:spcPct val="107000"/>
                         </a:lnSpc>
@@ -14147,7 +14050,7 @@
                 </a:tc>
                 <a:extLst>
                   <a:ext uri="{0D108BD9-81ED-4DB2-BD59-A6C34878D82A}">
-                    <a16:rowId xmlns:a16="http://schemas.microsoft.com/office/drawing/2014/main" val="10003"/>
+                    <a16:rowId xmlns:a16="http://schemas.microsoft.com/office/drawing/2014/main" xmlns="" val="10003"/>
                   </a:ext>
                 </a:extLst>
               </a:tr>
@@ -14157,7 +14060,7 @@
                     <a:bodyPr/>
                     <a:lstStyle/>
                     <a:p>
-                      <a:pPr algn="r">
+                      <a:pPr algn="l">
                         <a:lnSpc>
                           <a:spcPct val="107000"/>
                         </a:lnSpc>
@@ -14184,7 +14087,7 @@
                       </a:endParaRPr>
                     </a:p>
                     <a:p>
-                      <a:pPr marL="342900" lvl="0" indent="-342900" algn="r">
+                      <a:pPr marL="342900" lvl="0" indent="-342900" algn="l">
                         <a:lnSpc>
                           <a:spcPct val="107000"/>
                         </a:lnSpc>
@@ -14496,7 +14399,7 @@
                 </a:tc>
                 <a:extLst>
                   <a:ext uri="{0D108BD9-81ED-4DB2-BD59-A6C34878D82A}">
-                    <a16:rowId xmlns:a16="http://schemas.microsoft.com/office/drawing/2014/main" val="10004"/>
+                    <a16:rowId xmlns:a16="http://schemas.microsoft.com/office/drawing/2014/main" xmlns="" val="10004"/>
                   </a:ext>
                 </a:extLst>
               </a:tr>
@@ -14506,7 +14409,7 @@
                     <a:bodyPr/>
                     <a:lstStyle/>
                     <a:p>
-                      <a:pPr algn="r">
+                      <a:pPr algn="l">
                         <a:lnSpc>
                           <a:spcPct val="107000"/>
                         </a:lnSpc>
@@ -14553,7 +14456,7 @@
                       </a:endParaRPr>
                     </a:p>
                     <a:p>
-                      <a:pPr marL="342900" lvl="0" indent="-342900" algn="r">
+                      <a:pPr marL="342900" lvl="0" indent="-342900" algn="l">
                         <a:lnSpc>
                           <a:spcPct val="107000"/>
                         </a:lnSpc>
@@ -14858,7 +14761,7 @@
                 </a:tc>
                 <a:extLst>
                   <a:ext uri="{0D108BD9-81ED-4DB2-BD59-A6C34878D82A}">
-                    <a16:rowId xmlns:a16="http://schemas.microsoft.com/office/drawing/2014/main" val="10005"/>
+                    <a16:rowId xmlns:a16="http://schemas.microsoft.com/office/drawing/2014/main" xmlns="" val="10005"/>
                   </a:ext>
                 </a:extLst>
               </a:tr>
@@ -14868,7 +14771,7 @@
                     <a:bodyPr/>
                     <a:lstStyle/>
                     <a:p>
-                      <a:pPr algn="r">
+                      <a:pPr algn="l">
                         <a:lnSpc>
                           <a:spcPct val="107000"/>
                         </a:lnSpc>
@@ -14895,7 +14798,7 @@
                       </a:endParaRPr>
                     </a:p>
                     <a:p>
-                      <a:pPr marL="342900" lvl="0" indent="-342900" algn="r">
+                      <a:pPr marL="342900" lvl="0" indent="-342900" algn="l">
                         <a:lnSpc>
                           <a:spcPct val="107000"/>
                         </a:lnSpc>
@@ -15166,7 +15069,7 @@
                 </a:tc>
                 <a:extLst>
                   <a:ext uri="{0D108BD9-81ED-4DB2-BD59-A6C34878D82A}">
-                    <a16:rowId xmlns:a16="http://schemas.microsoft.com/office/drawing/2014/main" val="10006"/>
+                    <a16:rowId xmlns:a16="http://schemas.microsoft.com/office/drawing/2014/main" xmlns="" val="10006"/>
                   </a:ext>
                 </a:extLst>
               </a:tr>
@@ -15176,7 +15079,7 @@
                     <a:bodyPr/>
                     <a:lstStyle/>
                     <a:p>
-                      <a:pPr algn="r">
+                      <a:pPr algn="l">
                         <a:lnSpc>
                           <a:spcPct val="107000"/>
                         </a:lnSpc>
@@ -15457,7 +15360,7 @@
                       </a:endParaRPr>
                     </a:p>
                     <a:p>
-                      <a:pPr algn="r">
+                      <a:pPr algn="l">
                         <a:lnSpc>
                           <a:spcPct val="107000"/>
                         </a:lnSpc>
@@ -15595,7 +15498,7 @@
                       </a:endParaRPr>
                     </a:p>
                     <a:p>
-                      <a:pPr algn="r">
+                      <a:pPr algn="l">
                         <a:lnSpc>
                           <a:spcPct val="107000"/>
                         </a:lnSpc>
@@ -16041,7 +15944,7 @@
                 </a:tc>
                 <a:extLst>
                   <a:ext uri="{0D108BD9-81ED-4DB2-BD59-A6C34878D82A}">
-                    <a16:rowId xmlns:a16="http://schemas.microsoft.com/office/drawing/2014/main" val="10007"/>
+                    <a16:rowId xmlns:a16="http://schemas.microsoft.com/office/drawing/2014/main" xmlns="" val="10007"/>
                   </a:ext>
                 </a:extLst>
               </a:tr>
@@ -18694,7 +18597,7 @@
   <a:extraClrSchemeLst/>
   <a:extLst>
     <a:ext uri="{05A4C25C-085E-4340-85A3-A5531E510DB2}">
-      <thm15:themeFamily xmlns:thm15="http://schemas.microsoft.com/office/thememl/2012/main" name="Slice" id="{0507925B-6AC9-4358-8E18-C330545D08F8}" vid="{13FEC7C6-62A9-40C4-99D2-581AACACAA2F}"/>
+      <thm15:themeFamily xmlns:thm15="http://schemas.microsoft.com/office/thememl/2012/main" xmlns="" name="Slice" id="{0507925B-6AC9-4358-8E18-C330545D08F8}" vid="{13FEC7C6-62A9-40C4-99D2-581AACACAA2F}"/>
     </a:ext>
   </a:extLst>
 </a:theme>

</xml_diff>